<commit_message>
Basic framework for powerpoint added
</commit_message>
<xml_diff>
--- a/presentation_powerpoint.pptx
+++ b/presentation_powerpoint.pptx
@@ -9,6 +9,8 @@
     <p:sldId id="257" r:id="rId3"/>
     <p:sldId id="258" r:id="rId4"/>
     <p:sldId id="259" r:id="rId5"/>
+    <p:sldId id="260" r:id="rId6"/>
+    <p:sldId id="261" r:id="rId7"/>
   </p:sldIdLst>
   <p:sldSz cx="12192000" cy="6858000"/>
   <p:notesSz cx="6858000" cy="9144000"/>
@@ -107,6 +109,11 @@
       </a:defRPr>
     </a:lvl9pPr>
   </p:defaultTextStyle>
+  <p:extLst>
+    <p:ext uri="{EFAFB233-063F-42B5-8137-9DF3F51BA10A}">
+      <p15:sldGuideLst xmlns:p15="http://schemas.microsoft.com/office/powerpoint/2012/main"/>
+    </p:ext>
+  </p:extLst>
 </p:presentation>
 </file>
 
@@ -3628,7 +3635,7 @@
           <p:cNvPr id="2" name="Title 1">
             <a:extLst>
               <a:ext uri="{FF2B5EF4-FFF2-40B4-BE49-F238E27FC236}">
-                <a16:creationId xmlns:a16="http://schemas.microsoft.com/office/drawing/2014/main" id="{EA90D29C-2294-C785-A687-654439DC5B8A}"/>
+                <a16:creationId xmlns:a16="http://schemas.microsoft.com/office/drawing/2014/main" id="{286E8117-91A1-2515-E806-6341253F0CF9}"/>
               </a:ext>
             </a:extLst>
           </p:cNvPr>
@@ -3644,39 +3651,236 @@
           <a:bodyPr/>
           <a:lstStyle/>
           <a:p>
-            <a:endParaRPr lang="en-AU" dirty="0"/>
-          </a:p>
-        </p:txBody>
-      </p:sp>
-      <p:sp>
-        <p:nvSpPr>
-          <p:cNvPr id="3" name="Content Placeholder 2">
-            <a:extLst>
-              <a:ext uri="{FF2B5EF4-FFF2-40B4-BE49-F238E27FC236}">
-                <a16:creationId xmlns:a16="http://schemas.microsoft.com/office/drawing/2014/main" id="{1F747D2E-5667-628C-D6DB-124E69325AD6}"/>
-              </a:ext>
-            </a:extLst>
-          </p:cNvPr>
-          <p:cNvSpPr>
-            <a:spLocks noGrp="1"/>
-          </p:cNvSpPr>
-          <p:nvPr>
-            <p:ph idx="1"/>
-          </p:nvPr>
-        </p:nvSpPr>
-        <p:spPr/>
-        <p:txBody>
-          <a:bodyPr/>
-          <a:lstStyle/>
-          <a:p>
-            <a:endParaRPr lang="en-AU"/>
+            <a:r>
+              <a:rPr lang="en-AU" dirty="0"/>
+              <a:t>Method/Function Explanation</a:t>
+            </a:r>
+          </a:p>
+        </p:txBody>
+      </p:sp>
+      <p:sp>
+        <p:nvSpPr>
+          <p:cNvPr id="4" name="Picture Placeholder 3">
+            <a:extLst>
+              <a:ext uri="{FF2B5EF4-FFF2-40B4-BE49-F238E27FC236}">
+                <a16:creationId xmlns:a16="http://schemas.microsoft.com/office/drawing/2014/main" id="{AB617102-E7AE-F67C-BBC4-CF5E0C0BB5AA}"/>
+              </a:ext>
+            </a:extLst>
+          </p:cNvPr>
+          <p:cNvSpPr>
+            <a:spLocks noGrp="1"/>
+          </p:cNvSpPr>
+          <p:nvPr>
+            <p:ph type="pic" idx="1"/>
+          </p:nvPr>
+        </p:nvSpPr>
+        <p:spPr/>
+        <p:txBody>
+          <a:bodyPr/>
+          <a:lstStyle/>
+          <a:p>
+            <a:endParaRPr lang="en-AU"/>
+          </a:p>
+        </p:txBody>
+      </p:sp>
+      <p:sp>
+        <p:nvSpPr>
+          <p:cNvPr id="5" name="Text Placeholder 4">
+            <a:extLst>
+              <a:ext uri="{FF2B5EF4-FFF2-40B4-BE49-F238E27FC236}">
+                <a16:creationId xmlns:a16="http://schemas.microsoft.com/office/drawing/2014/main" id="{D81B748B-E320-2C71-7C50-F86C65D8028D}"/>
+              </a:ext>
+            </a:extLst>
+          </p:cNvPr>
+          <p:cNvSpPr>
+            <a:spLocks noGrp="1"/>
+          </p:cNvSpPr>
+          <p:nvPr>
+            <p:ph type="body" sz="half" idx="2"/>
+          </p:nvPr>
+        </p:nvSpPr>
+        <p:spPr/>
+        <p:txBody>
+          <a:bodyPr/>
+          <a:lstStyle/>
+          <a:p>
+            <a:r>
+              <a:rPr lang="en-AU" dirty="0"/>
+              <a:t>Picking function that has imported code in it</a:t>
+            </a:r>
           </a:p>
         </p:txBody>
       </p:sp>
     </p:spTree>
     <p:extLst>
       <p:ext uri="{BB962C8B-B14F-4D97-AF65-F5344CB8AC3E}">
-        <p14:creationId xmlns:p14="http://schemas.microsoft.com/office/powerpoint/2010/main" val="2860141451"/>
+        <p14:creationId xmlns:p14="http://schemas.microsoft.com/office/powerpoint/2010/main" val="4247718619"/>
+      </p:ext>
+    </p:extLst>
+  </p:cSld>
+  <p:clrMapOvr>
+    <a:masterClrMapping/>
+  </p:clrMapOvr>
+</p:sld>
+</file>
+
+<file path=ppt/slides/slide5.xml><?xml version="1.0" encoding="utf-8"?>
+<p:sld xmlns:a="http://schemas.openxmlformats.org/drawingml/2006/main" xmlns:r="http://schemas.openxmlformats.org/officeDocument/2006/relationships" xmlns:p="http://schemas.openxmlformats.org/presentationml/2006/main">
+  <p:cSld>
+    <p:spTree>
+      <p:nvGrpSpPr>
+        <p:cNvPr id="1" name=""/>
+        <p:cNvGrpSpPr/>
+        <p:nvPr/>
+      </p:nvGrpSpPr>
+      <p:grpSpPr>
+        <a:xfrm>
+          <a:off x="0" y="0"/>
+          <a:ext cx="0" cy="0"/>
+          <a:chOff x="0" y="0"/>
+          <a:chExt cx="0" cy="0"/>
+        </a:xfrm>
+      </p:grpSpPr>
+      <p:sp>
+        <p:nvSpPr>
+          <p:cNvPr id="2" name="Title 1">
+            <a:extLst>
+              <a:ext uri="{FF2B5EF4-FFF2-40B4-BE49-F238E27FC236}">
+                <a16:creationId xmlns:a16="http://schemas.microsoft.com/office/drawing/2014/main" id="{3864C65D-109A-F754-1941-FFA725539137}"/>
+              </a:ext>
+            </a:extLst>
+          </p:cNvPr>
+          <p:cNvSpPr>
+            <a:spLocks noGrp="1"/>
+          </p:cNvSpPr>
+          <p:nvPr>
+            <p:ph type="title"/>
+          </p:nvPr>
+        </p:nvSpPr>
+        <p:spPr/>
+        <p:txBody>
+          <a:bodyPr/>
+          <a:lstStyle/>
+          <a:p>
+            <a:r>
+              <a:rPr lang="en-AU" dirty="0"/>
+              <a:t>Class Explanation</a:t>
+            </a:r>
+          </a:p>
+        </p:txBody>
+      </p:sp>
+      <p:sp>
+        <p:nvSpPr>
+          <p:cNvPr id="3" name="Content Placeholder 2">
+            <a:extLst>
+              <a:ext uri="{FF2B5EF4-FFF2-40B4-BE49-F238E27FC236}">
+                <a16:creationId xmlns:a16="http://schemas.microsoft.com/office/drawing/2014/main" id="{D58C9DF8-BB96-925C-8299-553505739B52}"/>
+              </a:ext>
+            </a:extLst>
+          </p:cNvPr>
+          <p:cNvSpPr>
+            <a:spLocks noGrp="1"/>
+          </p:cNvSpPr>
+          <p:nvPr>
+            <p:ph idx="1"/>
+          </p:nvPr>
+        </p:nvSpPr>
+        <p:spPr/>
+        <p:txBody>
+          <a:bodyPr/>
+          <a:lstStyle/>
+          <a:p>
+            <a:endParaRPr lang="en-AU"/>
+          </a:p>
+        </p:txBody>
+      </p:sp>
+    </p:spTree>
+    <p:extLst>
+      <p:ext uri="{BB962C8B-B14F-4D97-AF65-F5344CB8AC3E}">
+        <p14:creationId xmlns:p14="http://schemas.microsoft.com/office/powerpoint/2010/main" val="258299022"/>
+      </p:ext>
+    </p:extLst>
+  </p:cSld>
+  <p:clrMapOvr>
+    <a:masterClrMapping/>
+  </p:clrMapOvr>
+</p:sld>
+</file>
+
+<file path=ppt/slides/slide6.xml><?xml version="1.0" encoding="utf-8"?>
+<p:sld xmlns:a="http://schemas.openxmlformats.org/drawingml/2006/main" xmlns:r="http://schemas.openxmlformats.org/officeDocument/2006/relationships" xmlns:p="http://schemas.openxmlformats.org/presentationml/2006/main">
+  <p:cSld>
+    <p:spTree>
+      <p:nvGrpSpPr>
+        <p:cNvPr id="1" name=""/>
+        <p:cNvGrpSpPr/>
+        <p:nvPr/>
+      </p:nvGrpSpPr>
+      <p:grpSpPr>
+        <a:xfrm>
+          <a:off x="0" y="0"/>
+          <a:ext cx="0" cy="0"/>
+          <a:chOff x="0" y="0"/>
+          <a:chExt cx="0" cy="0"/>
+        </a:xfrm>
+      </p:grpSpPr>
+      <p:sp>
+        <p:nvSpPr>
+          <p:cNvPr id="2" name="Title 1">
+            <a:extLst>
+              <a:ext uri="{FF2B5EF4-FFF2-40B4-BE49-F238E27FC236}">
+                <a16:creationId xmlns:a16="http://schemas.microsoft.com/office/drawing/2014/main" id="{E6D69275-0613-FC30-BAC8-93A7F1E6E358}"/>
+              </a:ext>
+            </a:extLst>
+          </p:cNvPr>
+          <p:cNvSpPr>
+            <a:spLocks noGrp="1"/>
+          </p:cNvSpPr>
+          <p:nvPr>
+            <p:ph type="title"/>
+          </p:nvPr>
+        </p:nvSpPr>
+        <p:spPr/>
+        <p:txBody>
+          <a:bodyPr/>
+          <a:lstStyle/>
+          <a:p>
+            <a:r>
+              <a:rPr lang="en-AU" dirty="0"/>
+              <a:t>Feedback Review</a:t>
+            </a:r>
+          </a:p>
+        </p:txBody>
+      </p:sp>
+      <p:sp>
+        <p:nvSpPr>
+          <p:cNvPr id="3" name="Content Placeholder 2">
+            <a:extLst>
+              <a:ext uri="{FF2B5EF4-FFF2-40B4-BE49-F238E27FC236}">
+                <a16:creationId xmlns:a16="http://schemas.microsoft.com/office/drawing/2014/main" id="{B05432EA-A4DD-3A95-8230-120F5BDCA39C}"/>
+              </a:ext>
+            </a:extLst>
+          </p:cNvPr>
+          <p:cNvSpPr>
+            <a:spLocks noGrp="1"/>
+          </p:cNvSpPr>
+          <p:nvPr>
+            <p:ph idx="1"/>
+          </p:nvPr>
+        </p:nvSpPr>
+        <p:spPr/>
+        <p:txBody>
+          <a:bodyPr/>
+          <a:lstStyle/>
+          <a:p>
+            <a:endParaRPr lang="en-AU"/>
+          </a:p>
+        </p:txBody>
+      </p:sp>
+    </p:spTree>
+    <p:extLst>
+      <p:ext uri="{BB962C8B-B14F-4D97-AF65-F5344CB8AC3E}">
+        <p14:creationId xmlns:p14="http://schemas.microsoft.com/office/powerpoint/2010/main" val="2670311819"/>
       </p:ext>
     </p:extLst>
   </p:cSld>

</xml_diff>

<commit_message>
Added three points to the ethical review slide, and made minor changes in other slides
</commit_message>
<xml_diff>
--- a/presentation_powerpoint.pptx
+++ b/presentation_powerpoint.pptx
@@ -302,7 +302,7 @@
           <a:p>
             <a:fld id="{D90120EC-953E-48DF-8E2D-0C8283984789}" type="datetimeFigureOut">
               <a:rPr lang="en-AU" smtClean="0"/>
-              <a:t>6/12/2024</a:t>
+              <a:t>7/12/2024</a:t>
             </a:fld>
             <a:endParaRPr lang="en-AU"/>
           </a:p>
@@ -600,7 +600,7 @@
           <a:p>
             <a:fld id="{D90120EC-953E-48DF-8E2D-0C8283984789}" type="datetimeFigureOut">
               <a:rPr lang="en-AU" smtClean="0"/>
-              <a:t>6/12/2024</a:t>
+              <a:t>7/12/2024</a:t>
             </a:fld>
             <a:endParaRPr lang="en-AU"/>
           </a:p>
@@ -792,7 +792,7 @@
           <a:p>
             <a:fld id="{D90120EC-953E-48DF-8E2D-0C8283984789}" type="datetimeFigureOut">
               <a:rPr lang="en-AU" smtClean="0"/>
-              <a:t>6/12/2024</a:t>
+              <a:t>7/12/2024</a:t>
             </a:fld>
             <a:endParaRPr lang="en-AU"/>
           </a:p>
@@ -1053,7 +1053,7 @@
           <a:p>
             <a:fld id="{D90120EC-953E-48DF-8E2D-0C8283984789}" type="datetimeFigureOut">
               <a:rPr lang="en-AU" smtClean="0"/>
-              <a:t>6/12/2024</a:t>
+              <a:t>7/12/2024</a:t>
             </a:fld>
             <a:endParaRPr lang="en-AU"/>
           </a:p>
@@ -1477,7 +1477,7 @@
           <a:p>
             <a:fld id="{D90120EC-953E-48DF-8E2D-0C8283984789}" type="datetimeFigureOut">
               <a:rPr lang="en-AU" smtClean="0"/>
-              <a:t>6/12/2024</a:t>
+              <a:t>7/12/2024</a:t>
             </a:fld>
             <a:endParaRPr lang="en-AU"/>
           </a:p>
@@ -2014,7 +2014,7 @@
           <a:p>
             <a:fld id="{D90120EC-953E-48DF-8E2D-0C8283984789}" type="datetimeFigureOut">
               <a:rPr lang="en-AU" smtClean="0"/>
-              <a:t>6/12/2024</a:t>
+              <a:t>7/12/2024</a:t>
             </a:fld>
             <a:endParaRPr lang="en-AU"/>
           </a:p>
@@ -2878,7 +2878,7 @@
           <a:p>
             <a:fld id="{D90120EC-953E-48DF-8E2D-0C8283984789}" type="datetimeFigureOut">
               <a:rPr lang="en-AU" smtClean="0"/>
-              <a:t>6/12/2024</a:t>
+              <a:t>7/12/2024</a:t>
             </a:fld>
             <a:endParaRPr lang="en-AU"/>
           </a:p>
@@ -3048,7 +3048,7 @@
           <a:p>
             <a:fld id="{D90120EC-953E-48DF-8E2D-0C8283984789}" type="datetimeFigureOut">
               <a:rPr lang="en-AU" smtClean="0"/>
-              <a:t>6/12/2024</a:t>
+              <a:t>7/12/2024</a:t>
             </a:fld>
             <a:endParaRPr lang="en-AU"/>
           </a:p>
@@ -3232,7 +3232,7 @@
           <a:p>
             <a:fld id="{D90120EC-953E-48DF-8E2D-0C8283984789}" type="datetimeFigureOut">
               <a:rPr lang="en-AU" smtClean="0"/>
-              <a:t>6/12/2024</a:t>
+              <a:t>7/12/2024</a:t>
             </a:fld>
             <a:endParaRPr lang="en-AU"/>
           </a:p>
@@ -3402,7 +3402,7 @@
           <a:p>
             <a:fld id="{D90120EC-953E-48DF-8E2D-0C8283984789}" type="datetimeFigureOut">
               <a:rPr lang="en-AU" smtClean="0"/>
-              <a:t>6/12/2024</a:t>
+              <a:t>7/12/2024</a:t>
             </a:fld>
             <a:endParaRPr lang="en-AU"/>
           </a:p>
@@ -3646,7 +3646,7 @@
           <a:p>
             <a:fld id="{D90120EC-953E-48DF-8E2D-0C8283984789}" type="datetimeFigureOut">
               <a:rPr lang="en-AU" smtClean="0"/>
-              <a:t>6/12/2024</a:t>
+              <a:t>7/12/2024</a:t>
             </a:fld>
             <a:endParaRPr lang="en-AU"/>
           </a:p>
@@ -3882,7 +3882,7 @@
           <a:p>
             <a:fld id="{D90120EC-953E-48DF-8E2D-0C8283984789}" type="datetimeFigureOut">
               <a:rPr lang="en-AU" smtClean="0"/>
-              <a:t>6/12/2024</a:t>
+              <a:t>7/12/2024</a:t>
             </a:fld>
             <a:endParaRPr lang="en-AU"/>
           </a:p>
@@ -4348,7 +4348,7 @@
           <a:p>
             <a:fld id="{D90120EC-953E-48DF-8E2D-0C8283984789}" type="datetimeFigureOut">
               <a:rPr lang="en-AU" smtClean="0"/>
-              <a:t>6/12/2024</a:t>
+              <a:t>7/12/2024</a:t>
             </a:fld>
             <a:endParaRPr lang="en-AU"/>
           </a:p>
@@ -4466,7 +4466,7 @@
           <a:p>
             <a:fld id="{D90120EC-953E-48DF-8E2D-0C8283984789}" type="datetimeFigureOut">
               <a:rPr lang="en-AU" smtClean="0"/>
-              <a:t>6/12/2024</a:t>
+              <a:t>7/12/2024</a:t>
             </a:fld>
             <a:endParaRPr lang="en-AU"/>
           </a:p>
@@ -4561,7 +4561,7 @@
           <a:p>
             <a:fld id="{D90120EC-953E-48DF-8E2D-0C8283984789}" type="datetimeFigureOut">
               <a:rPr lang="en-AU" smtClean="0"/>
-              <a:t>6/12/2024</a:t>
+              <a:t>7/12/2024</a:t>
             </a:fld>
             <a:endParaRPr lang="en-AU"/>
           </a:p>
@@ -4816,7 +4816,7 @@
           <a:p>
             <a:fld id="{D90120EC-953E-48DF-8E2D-0C8283984789}" type="datetimeFigureOut">
               <a:rPr lang="en-AU" smtClean="0"/>
-              <a:t>6/12/2024</a:t>
+              <a:t>7/12/2024</a:t>
             </a:fld>
             <a:endParaRPr lang="en-AU"/>
           </a:p>
@@ -5116,7 +5116,7 @@
           <a:p>
             <a:fld id="{D90120EC-953E-48DF-8E2D-0C8283984789}" type="datetimeFigureOut">
               <a:rPr lang="en-AU" smtClean="0"/>
-              <a:t>6/12/2024</a:t>
+              <a:t>7/12/2024</a:t>
             </a:fld>
             <a:endParaRPr lang="en-AU"/>
           </a:p>
@@ -5350,7 +5350,7 @@
           <a:p>
             <a:fld id="{D90120EC-953E-48DF-8E2D-0C8283984789}" type="datetimeFigureOut">
               <a:rPr lang="en-AU" smtClean="0"/>
-              <a:t>6/12/2024</a:t>
+              <a:t>7/12/2024</a:t>
             </a:fld>
             <a:endParaRPr lang="en-AU"/>
           </a:p>
@@ -6267,8 +6267,24 @@
           <a:p>
             <a:r>
               <a:rPr lang="en-AU" dirty="0"/>
-              <a:t>Due mostly to the simplicity of the project, no ethical concerns were raised.</a:t>
-            </a:r>
+              <a:t>Because the application specifically refers to alcoholic beverages, there is the necessity to ensure that the application is used only by parties that bear in mind the consequences that alcohol can have on different groups.</a:t>
+            </a:r>
+          </a:p>
+          <a:p>
+            <a:pPr lvl="1"/>
+            <a:r>
+              <a:rPr lang="en-AU" dirty="0"/>
+              <a:t>As an addon to concerns about alcohol, the app provides information relevant to Australian standard drinks, the information is provided to assist in managing alcohol consumption, but there exists the concern that is could result in the opposite.</a:t>
+            </a:r>
+          </a:p>
+          <a:p>
+            <a:r>
+              <a:rPr lang="en-AU" dirty="0"/>
+              <a:t>While the application does not actively track stock (though that could be a future feature), the application does concern itself with pricing. The use of the application in a setting where money is exchanged is cause for care to be taken in its use.</a:t>
+            </a:r>
+          </a:p>
+          <a:p>
+            <a:endParaRPr lang="en-AU" dirty="0"/>
           </a:p>
         </p:txBody>
       </p:sp>
@@ -6404,7 +6420,7 @@
         </p:blipFill>
         <p:spPr>
           <a:xfrm>
-            <a:off x="6363164" y="2374925"/>
+            <a:off x="6363164" y="1754366"/>
             <a:ext cx="4744112" cy="3820058"/>
           </a:xfrm>
         </p:spPr>
@@ -6449,11 +6465,8 @@
           <a:p>
             <a:r>
               <a:rPr lang="en-AU" sz="1400" dirty="0"/>
-              <a:t>Checks for and creates item codes when new stock items or mixes are created by a users.</a:t>
-            </a:r>
-          </a:p>
-          <a:p>
-            <a:endParaRPr lang="en-AU" sz="1400" dirty="0"/>
+              <a:t>Checks for and creates item codes when new stock items or mixes are created by a users. Makes use of the inbuilt python module ‘random’.</a:t>
+            </a:r>
           </a:p>
           <a:p>
             <a:r>
@@ -6476,9 +6489,52 @@
             </a:r>
             <a:r>
               <a:rPr lang="en-AU" sz="1400" dirty="0"/>
-              <a:t>() function.</a:t>
+              <a:t> function.</a:t>
             </a:r>
             <a:endParaRPr lang="en-AU" sz="1400" b="1" dirty="0"/>
+          </a:p>
+        </p:txBody>
+      </p:sp>
+      <p:sp>
+        <p:nvSpPr>
+          <p:cNvPr id="3" name="TextBox 2">
+            <a:extLst>
+              <a:ext uri="{FF2B5EF4-FFF2-40B4-BE49-F238E27FC236}">
+                <a16:creationId xmlns:a16="http://schemas.microsoft.com/office/drawing/2014/main" id="{C5FD5351-3C0A-C3CC-F060-BD98725A81C5}"/>
+              </a:ext>
+            </a:extLst>
+          </p:cNvPr>
+          <p:cNvSpPr txBox="1"/>
+          <p:nvPr/>
+        </p:nvSpPr>
+        <p:spPr>
+          <a:xfrm>
+            <a:off x="6363164" y="5748740"/>
+            <a:ext cx="4744112" cy="738664"/>
+          </a:xfrm>
+          <a:prstGeom prst="rect">
+            <a:avLst/>
+          </a:prstGeom>
+          <a:noFill/>
+        </p:spPr>
+        <p:txBody>
+          <a:bodyPr wrap="square" rtlCol="0">
+            <a:spAutoFit/>
+          </a:bodyPr>
+          <a:lstStyle/>
+          <a:p>
+            <a:r>
+              <a:rPr lang="en-AU" sz="1400" dirty="0"/>
+              <a:t>The random module was used so that each code would be unique, as the </a:t>
+            </a:r>
+            <a:r>
+              <a:rPr lang="en-AU" sz="1400" dirty="0" err="1"/>
+              <a:t>randint</a:t>
+            </a:r>
+            <a:r>
+              <a:rPr lang="en-AU" sz="1400" dirty="0"/>
+              <a:t> method specifically, will produce an integer value that is distinct to any code used before it.</a:t>
+            </a:r>
           </a:p>
         </p:txBody>
       </p:sp>
@@ -6594,18 +6650,21 @@
           </a:bodyPr>
           <a:lstStyle/>
           <a:p>
+            <a:pPr algn="l"/>
             <a:r>
               <a:rPr lang="en-AU" dirty="0"/>
               <a:t>The Spirit class, much like the Beer, Wine and Mix classes, inherits from the Beverage class.</a:t>
             </a:r>
           </a:p>
           <a:p>
+            <a:pPr algn="l"/>
             <a:r>
               <a:rPr lang="en-AU" dirty="0"/>
               <a:t>The difference between the classes is primarily the data which they collect, as an example, unlike the Beer and Wine classes, the Spirit class has the subtype object, and as such it needs additional getters and setters for that object.</a:t>
             </a:r>
           </a:p>
           <a:p>
+            <a:pPr algn="l"/>
             <a:r>
               <a:rPr lang="en-AU" dirty="0"/>
               <a:t>Each of the classes also has a different __str__ method, so that they can display the appropriate information when called.</a:t>

</xml_diff>